<commit_message>
Add the figures and tables of evaluations
</commit_message>
<xml_diff>
--- a/ISORC2017/figure/EvaluationOfAdapter.pptx
+++ b/ISORC2017/figure/EvaluationOfAdapter.pptx
@@ -115,79 +115,1245 @@
 </p:presentation>
 </file>
 
-<file path=ppt/charts/chart1.xml><?xml version="1.0" encoding="utf-8"?>
+<file path=ppt/charts/chartEx1.xml><?xml version="1.0" encoding="utf-8"?>
 <cx:chartSpace xmlns:a="http://schemas.openxmlformats.org/drawingml/2006/main" xmlns:r="http://schemas.openxmlformats.org/officeDocument/2006/relationships" xmlns:cx="http://schemas.microsoft.com/office/drawing/2014/chartex">
   <cx:chartData>
     <cx:externalData r:id="rId1" cx:autoUpdate="0"/>
     <cx:data id="0">
       <cx:numDim type="val">
-        <cx:f>Sheet1!$A$2:$A$9</cx:f>
-        <cx:lvl ptCount="8" formatCode="G/標準"/>
+        <cx:f>Sheet1!$A$2:$A$371</cx:f>
+        <cx:lvl ptCount="370" formatCode="G/標準">
+          <cx:pt idx="0">26</cx:pt>
+          <cx:pt idx="1">26</cx:pt>
+          <cx:pt idx="2">25</cx:pt>
+          <cx:pt idx="3">25</cx:pt>
+          <cx:pt idx="4">25</cx:pt>
+          <cx:pt idx="5">25</cx:pt>
+          <cx:pt idx="6">24</cx:pt>
+          <cx:pt idx="7">24</cx:pt>
+          <cx:pt idx="8">24</cx:pt>
+          <cx:pt idx="9">24</cx:pt>
+          <cx:pt idx="10">24</cx:pt>
+          <cx:pt idx="11">24</cx:pt>
+          <cx:pt idx="12">23</cx:pt>
+          <cx:pt idx="13">23</cx:pt>
+          <cx:pt idx="14">23</cx:pt>
+          <cx:pt idx="15">23</cx:pt>
+          <cx:pt idx="16">23</cx:pt>
+          <cx:pt idx="17">23</cx:pt>
+          <cx:pt idx="18">22</cx:pt>
+          <cx:pt idx="19">22</cx:pt>
+          <cx:pt idx="20">22</cx:pt>
+          <cx:pt idx="21">22</cx:pt>
+          <cx:pt idx="22">22</cx:pt>
+          <cx:pt idx="23">22</cx:pt>
+          <cx:pt idx="24">22</cx:pt>
+          <cx:pt idx="25">22</cx:pt>
+          <cx:pt idx="26">21</cx:pt>
+          <cx:pt idx="27">21</cx:pt>
+          <cx:pt idx="28">21</cx:pt>
+          <cx:pt idx="29">21</cx:pt>
+          <cx:pt idx="30">21</cx:pt>
+          <cx:pt idx="31">21</cx:pt>
+          <cx:pt idx="32">21</cx:pt>
+          <cx:pt idx="33">21</cx:pt>
+          <cx:pt idx="34">21</cx:pt>
+          <cx:pt idx="35">21</cx:pt>
+          <cx:pt idx="36">20</cx:pt>
+          <cx:pt idx="37">20</cx:pt>
+          <cx:pt idx="38">20</cx:pt>
+          <cx:pt idx="39">20</cx:pt>
+          <cx:pt idx="40">20</cx:pt>
+          <cx:pt idx="41">20</cx:pt>
+          <cx:pt idx="42">20</cx:pt>
+          <cx:pt idx="43">20</cx:pt>
+          <cx:pt idx="44">20</cx:pt>
+          <cx:pt idx="45">20</cx:pt>
+          <cx:pt idx="46">20</cx:pt>
+          <cx:pt idx="47">20</cx:pt>
+          <cx:pt idx="48">20</cx:pt>
+          <cx:pt idx="49">20</cx:pt>
+          <cx:pt idx="50">20</cx:pt>
+          <cx:pt idx="51">20</cx:pt>
+          <cx:pt idx="52">20</cx:pt>
+          <cx:pt idx="53">20</cx:pt>
+          <cx:pt idx="54">19</cx:pt>
+          <cx:pt idx="55">19</cx:pt>
+          <cx:pt idx="56">19</cx:pt>
+          <cx:pt idx="57">19</cx:pt>
+          <cx:pt idx="58">18</cx:pt>
+          <cx:pt idx="59">18</cx:pt>
+          <cx:pt idx="60">18</cx:pt>
+          <cx:pt idx="61">18</cx:pt>
+          <cx:pt idx="62">18</cx:pt>
+          <cx:pt idx="63">18</cx:pt>
+          <cx:pt idx="64">18</cx:pt>
+          <cx:pt idx="65">18</cx:pt>
+          <cx:pt idx="66">18</cx:pt>
+          <cx:pt idx="67">18</cx:pt>
+          <cx:pt idx="68">17</cx:pt>
+          <cx:pt idx="69">17</cx:pt>
+          <cx:pt idx="70">17</cx:pt>
+          <cx:pt idx="71">17</cx:pt>
+          <cx:pt idx="72">17</cx:pt>
+          <cx:pt idx="73">17</cx:pt>
+          <cx:pt idx="74">17</cx:pt>
+          <cx:pt idx="75">17</cx:pt>
+          <cx:pt idx="76">17</cx:pt>
+          <cx:pt idx="77">17</cx:pt>
+          <cx:pt idx="78">16</cx:pt>
+          <cx:pt idx="79">16</cx:pt>
+          <cx:pt idx="80">16</cx:pt>
+          <cx:pt idx="81">16</cx:pt>
+          <cx:pt idx="82">16</cx:pt>
+          <cx:pt idx="83">16</cx:pt>
+          <cx:pt idx="84">16</cx:pt>
+          <cx:pt idx="85">16</cx:pt>
+          <cx:pt idx="86">16</cx:pt>
+          <cx:pt idx="87">16</cx:pt>
+          <cx:pt idx="88">16</cx:pt>
+          <cx:pt idx="89">16</cx:pt>
+          <cx:pt idx="90">16</cx:pt>
+          <cx:pt idx="91">16</cx:pt>
+          <cx:pt idx="92">16</cx:pt>
+          <cx:pt idx="93">16</cx:pt>
+          <cx:pt idx="94">15</cx:pt>
+          <cx:pt idx="95">15</cx:pt>
+          <cx:pt idx="96">15</cx:pt>
+          <cx:pt idx="97">15</cx:pt>
+          <cx:pt idx="98">15</cx:pt>
+          <cx:pt idx="99">15</cx:pt>
+          <cx:pt idx="100">15</cx:pt>
+          <cx:pt idx="101">15</cx:pt>
+          <cx:pt idx="102">15</cx:pt>
+          <cx:pt idx="103">15</cx:pt>
+          <cx:pt idx="104">15</cx:pt>
+          <cx:pt idx="105">15</cx:pt>
+          <cx:pt idx="106">15</cx:pt>
+          <cx:pt idx="107">15</cx:pt>
+          <cx:pt idx="108">15</cx:pt>
+          <cx:pt idx="109">15</cx:pt>
+          <cx:pt idx="110">15</cx:pt>
+          <cx:pt idx="111">15</cx:pt>
+          <cx:pt idx="112">15</cx:pt>
+          <cx:pt idx="113">15</cx:pt>
+          <cx:pt idx="114">15</cx:pt>
+          <cx:pt idx="115">15</cx:pt>
+          <cx:pt idx="116">15</cx:pt>
+          <cx:pt idx="117">15</cx:pt>
+          <cx:pt idx="118">15</cx:pt>
+          <cx:pt idx="119">15</cx:pt>
+          <cx:pt idx="120">15</cx:pt>
+          <cx:pt idx="121">15</cx:pt>
+          <cx:pt idx="122">15</cx:pt>
+          <cx:pt idx="123">15</cx:pt>
+          <cx:pt idx="124">15</cx:pt>
+          <cx:pt idx="125">15</cx:pt>
+          <cx:pt idx="126">15</cx:pt>
+          <cx:pt idx="127">15</cx:pt>
+          <cx:pt idx="128">15</cx:pt>
+          <cx:pt idx="129">15</cx:pt>
+          <cx:pt idx="130">15</cx:pt>
+          <cx:pt idx="131">15</cx:pt>
+          <cx:pt idx="132">15</cx:pt>
+          <cx:pt idx="133">15</cx:pt>
+          <cx:pt idx="134">15</cx:pt>
+          <cx:pt idx="135">15</cx:pt>
+          <cx:pt idx="136">15</cx:pt>
+          <cx:pt idx="137">15</cx:pt>
+          <cx:pt idx="138">15</cx:pt>
+          <cx:pt idx="139">15</cx:pt>
+          <cx:pt idx="140">15</cx:pt>
+          <cx:pt idx="141">15</cx:pt>
+          <cx:pt idx="142">15</cx:pt>
+          <cx:pt idx="143">15</cx:pt>
+          <cx:pt idx="144">15</cx:pt>
+          <cx:pt idx="145">15</cx:pt>
+          <cx:pt idx="146">15</cx:pt>
+          <cx:pt idx="147">15</cx:pt>
+          <cx:pt idx="148">15</cx:pt>
+          <cx:pt idx="149">15</cx:pt>
+          <cx:pt idx="150">15</cx:pt>
+          <cx:pt idx="151">15</cx:pt>
+          <cx:pt idx="152">15</cx:pt>
+          <cx:pt idx="153">15</cx:pt>
+          <cx:pt idx="154">15</cx:pt>
+          <cx:pt idx="155">15</cx:pt>
+          <cx:pt idx="156">14</cx:pt>
+          <cx:pt idx="157">14</cx:pt>
+          <cx:pt idx="158">14</cx:pt>
+          <cx:pt idx="159">14</cx:pt>
+          <cx:pt idx="160">14</cx:pt>
+          <cx:pt idx="161">14</cx:pt>
+          <cx:pt idx="162">14</cx:pt>
+          <cx:pt idx="163">14</cx:pt>
+          <cx:pt idx="164">14</cx:pt>
+          <cx:pt idx="165">14</cx:pt>
+          <cx:pt idx="166">14</cx:pt>
+          <cx:pt idx="167">14</cx:pt>
+          <cx:pt idx="168">14</cx:pt>
+          <cx:pt idx="169">14</cx:pt>
+          <cx:pt idx="170">14</cx:pt>
+          <cx:pt idx="171">14</cx:pt>
+          <cx:pt idx="172">14</cx:pt>
+          <cx:pt idx="173">14</cx:pt>
+          <cx:pt idx="174">14</cx:pt>
+          <cx:pt idx="175">14</cx:pt>
+          <cx:pt idx="176">14</cx:pt>
+          <cx:pt idx="177">14</cx:pt>
+          <cx:pt idx="178">14</cx:pt>
+          <cx:pt idx="179">14</cx:pt>
+          <cx:pt idx="180">14</cx:pt>
+          <cx:pt idx="181">14</cx:pt>
+          <cx:pt idx="182">14</cx:pt>
+          <cx:pt idx="183">14</cx:pt>
+          <cx:pt idx="184">14</cx:pt>
+          <cx:pt idx="185">14</cx:pt>
+          <cx:pt idx="186">14</cx:pt>
+          <cx:pt idx="187">14</cx:pt>
+          <cx:pt idx="188">14</cx:pt>
+          <cx:pt idx="189">14</cx:pt>
+          <cx:pt idx="190">14</cx:pt>
+          <cx:pt idx="191">14</cx:pt>
+          <cx:pt idx="192">14</cx:pt>
+          <cx:pt idx="193">14</cx:pt>
+          <cx:pt idx="194">14</cx:pt>
+          <cx:pt idx="195">14</cx:pt>
+          <cx:pt idx="196">14</cx:pt>
+          <cx:pt idx="197">14</cx:pt>
+          <cx:pt idx="198">14</cx:pt>
+          <cx:pt idx="199">14</cx:pt>
+          <cx:pt idx="200">14</cx:pt>
+          <cx:pt idx="201">14</cx:pt>
+          <cx:pt idx="202">14</cx:pt>
+          <cx:pt idx="203">14</cx:pt>
+          <cx:pt idx="204">14</cx:pt>
+          <cx:pt idx="205">14</cx:pt>
+          <cx:pt idx="206">14</cx:pt>
+          <cx:pt idx="207">14</cx:pt>
+          <cx:pt idx="208">14</cx:pt>
+          <cx:pt idx="209">14</cx:pt>
+          <cx:pt idx="210">14</cx:pt>
+          <cx:pt idx="211">14</cx:pt>
+          <cx:pt idx="212">14</cx:pt>
+          <cx:pt idx="213">14</cx:pt>
+          <cx:pt idx="214">14</cx:pt>
+          <cx:pt idx="215">14</cx:pt>
+          <cx:pt idx="216">14</cx:pt>
+          <cx:pt idx="217">14</cx:pt>
+          <cx:pt idx="218">14</cx:pt>
+          <cx:pt idx="219">14</cx:pt>
+          <cx:pt idx="220">14</cx:pt>
+          <cx:pt idx="221">14</cx:pt>
+          <cx:pt idx="222">14</cx:pt>
+          <cx:pt idx="223">14</cx:pt>
+          <cx:pt idx="224">14</cx:pt>
+          <cx:pt idx="225">14</cx:pt>
+          <cx:pt idx="226">14</cx:pt>
+          <cx:pt idx="227">14</cx:pt>
+          <cx:pt idx="228">14</cx:pt>
+          <cx:pt idx="229">14</cx:pt>
+          <cx:pt idx="230">14</cx:pt>
+          <cx:pt idx="231">14</cx:pt>
+          <cx:pt idx="232">14</cx:pt>
+          <cx:pt idx="233">14</cx:pt>
+          <cx:pt idx="234">14</cx:pt>
+          <cx:pt idx="235">14</cx:pt>
+          <cx:pt idx="236">14</cx:pt>
+          <cx:pt idx="237">14</cx:pt>
+          <cx:pt idx="238">14</cx:pt>
+          <cx:pt idx="239">14</cx:pt>
+          <cx:pt idx="240">14</cx:pt>
+          <cx:pt idx="241">14</cx:pt>
+          <cx:pt idx="242">14</cx:pt>
+          <cx:pt idx="243">14</cx:pt>
+          <cx:pt idx="244">14</cx:pt>
+          <cx:pt idx="245">14</cx:pt>
+          <cx:pt idx="246">14</cx:pt>
+          <cx:pt idx="247">14</cx:pt>
+          <cx:pt idx="248">14</cx:pt>
+          <cx:pt idx="249">14</cx:pt>
+          <cx:pt idx="250">14</cx:pt>
+          <cx:pt idx="251">14</cx:pt>
+          <cx:pt idx="252">14</cx:pt>
+          <cx:pt idx="253">14</cx:pt>
+          <cx:pt idx="254">14</cx:pt>
+          <cx:pt idx="255">14</cx:pt>
+          <cx:pt idx="256">13</cx:pt>
+          <cx:pt idx="257">13</cx:pt>
+          <cx:pt idx="258">13</cx:pt>
+          <cx:pt idx="259">13</cx:pt>
+          <cx:pt idx="260">13</cx:pt>
+          <cx:pt idx="261">13</cx:pt>
+          <cx:pt idx="262">13</cx:pt>
+          <cx:pt idx="263">13</cx:pt>
+          <cx:pt idx="264">13</cx:pt>
+          <cx:pt idx="265">13</cx:pt>
+          <cx:pt idx="266">13</cx:pt>
+          <cx:pt idx="267">13</cx:pt>
+          <cx:pt idx="268">13</cx:pt>
+          <cx:pt idx="269">13</cx:pt>
+          <cx:pt idx="270">13</cx:pt>
+          <cx:pt idx="271">13</cx:pt>
+          <cx:pt idx="272">13</cx:pt>
+          <cx:pt idx="273">13</cx:pt>
+          <cx:pt idx="274">13</cx:pt>
+          <cx:pt idx="275">13</cx:pt>
+          <cx:pt idx="276">13</cx:pt>
+          <cx:pt idx="277">13</cx:pt>
+          <cx:pt idx="278">13</cx:pt>
+          <cx:pt idx="279">13</cx:pt>
+          <cx:pt idx="280">13</cx:pt>
+          <cx:pt idx="281">13</cx:pt>
+          <cx:pt idx="282">12</cx:pt>
+          <cx:pt idx="283">12</cx:pt>
+        </cx:lvl>
       </cx:numDim>
     </cx:data>
     <cx:data id="1">
       <cx:numDim type="val">
-        <cx:f>Sheet1!$B$2:$B$9</cx:f>
-        <cx:lvl ptCount="8" formatCode="G/標準">
-          <cx:pt idx="0">10</cx:pt>
-          <cx:pt idx="1">10</cx:pt>
-          <cx:pt idx="2">13</cx:pt>
-          <cx:pt idx="3">12</cx:pt>
-          <cx:pt idx="4">14</cx:pt>
-          <cx:pt idx="5">30</cx:pt>
-          <cx:pt idx="6">1</cx:pt>
-          <cx:pt idx="7">20</cx:pt>
+        <cx:f>Sheet1!$B$2:$B$371</cx:f>
+        <cx:lvl ptCount="370" formatCode="G/標準">
+          <cx:pt idx="0">28</cx:pt>
+          <cx:pt idx="1">28</cx:pt>
+          <cx:pt idx="2">26</cx:pt>
+          <cx:pt idx="3">26</cx:pt>
+          <cx:pt idx="4">25</cx:pt>
+          <cx:pt idx="5">25</cx:pt>
+          <cx:pt idx="6">24</cx:pt>
+          <cx:pt idx="7">24</cx:pt>
+          <cx:pt idx="8">24</cx:pt>
+          <cx:pt idx="9">24</cx:pt>
+          <cx:pt idx="10">24</cx:pt>
+          <cx:pt idx="11">24</cx:pt>
+          <cx:pt idx="12">23</cx:pt>
+          <cx:pt idx="13">23</cx:pt>
+          <cx:pt idx="14">23</cx:pt>
+          <cx:pt idx="15">23</cx:pt>
+          <cx:pt idx="16">22</cx:pt>
+          <cx:pt idx="17">22</cx:pt>
+          <cx:pt idx="18">21</cx:pt>
+          <cx:pt idx="19">21</cx:pt>
+          <cx:pt idx="20">21</cx:pt>
+          <cx:pt idx="21">21</cx:pt>
+          <cx:pt idx="22">21</cx:pt>
+          <cx:pt idx="23">21</cx:pt>
+          <cx:pt idx="24">21</cx:pt>
+          <cx:pt idx="25">21</cx:pt>
+          <cx:pt idx="26">21</cx:pt>
+          <cx:pt idx="27">21</cx:pt>
+          <cx:pt idx="28">21</cx:pt>
+          <cx:pt idx="29">21</cx:pt>
+          <cx:pt idx="30">20</cx:pt>
+          <cx:pt idx="31">20</cx:pt>
+          <cx:pt idx="32">20</cx:pt>
+          <cx:pt idx="33">20</cx:pt>
+          <cx:pt idx="34">20</cx:pt>
+          <cx:pt idx="35">20</cx:pt>
+          <cx:pt idx="36">20</cx:pt>
+          <cx:pt idx="37">20</cx:pt>
+          <cx:pt idx="38">20</cx:pt>
+          <cx:pt idx="39">20</cx:pt>
+          <cx:pt idx="40">20</cx:pt>
+          <cx:pt idx="41">20</cx:pt>
+          <cx:pt idx="42">19</cx:pt>
+          <cx:pt idx="43">19</cx:pt>
+          <cx:pt idx="44">19</cx:pt>
+          <cx:pt idx="45">19</cx:pt>
+          <cx:pt idx="46">19</cx:pt>
+          <cx:pt idx="47">19</cx:pt>
+          <cx:pt idx="48">19</cx:pt>
+          <cx:pt idx="49">19</cx:pt>
+          <cx:pt idx="50">19</cx:pt>
+          <cx:pt idx="51">19</cx:pt>
+          <cx:pt idx="52">19</cx:pt>
+          <cx:pt idx="53">19</cx:pt>
+          <cx:pt idx="54">18</cx:pt>
+          <cx:pt idx="55">18</cx:pt>
+          <cx:pt idx="56">18</cx:pt>
+          <cx:pt idx="57">18</cx:pt>
+          <cx:pt idx="58">18</cx:pt>
+          <cx:pt idx="59">18</cx:pt>
+          <cx:pt idx="60">18</cx:pt>
+          <cx:pt idx="61">18</cx:pt>
+          <cx:pt idx="62">17</cx:pt>
+          <cx:pt idx="63">17</cx:pt>
+          <cx:pt idx="64">17</cx:pt>
+          <cx:pt idx="65">17</cx:pt>
+          <cx:pt idx="66">17</cx:pt>
+          <cx:pt idx="67">17</cx:pt>
+          <cx:pt idx="68">17</cx:pt>
+          <cx:pt idx="69">17</cx:pt>
+          <cx:pt idx="70">16</cx:pt>
+          <cx:pt idx="71">16</cx:pt>
+          <cx:pt idx="72">16</cx:pt>
+          <cx:pt idx="73">16</cx:pt>
+          <cx:pt idx="74">16</cx:pt>
+          <cx:pt idx="75">16</cx:pt>
+          <cx:pt idx="76">16</cx:pt>
+          <cx:pt idx="77">16</cx:pt>
+          <cx:pt idx="78">16</cx:pt>
+          <cx:pt idx="79">16</cx:pt>
+          <cx:pt idx="80">16</cx:pt>
+          <cx:pt idx="81">16</cx:pt>
+          <cx:pt idx="82">16</cx:pt>
+          <cx:pt idx="83">16</cx:pt>
+          <cx:pt idx="84">16</cx:pt>
+          <cx:pt idx="85">16</cx:pt>
+          <cx:pt idx="86">16</cx:pt>
+          <cx:pt idx="87">16</cx:pt>
+          <cx:pt idx="88">15</cx:pt>
+          <cx:pt idx="89">15</cx:pt>
+          <cx:pt idx="90">15</cx:pt>
+          <cx:pt idx="91">15</cx:pt>
+          <cx:pt idx="92">15</cx:pt>
+          <cx:pt idx="93">15</cx:pt>
+          <cx:pt idx="94">15</cx:pt>
+          <cx:pt idx="95">15</cx:pt>
+          <cx:pt idx="96">15</cx:pt>
+          <cx:pt idx="97">15</cx:pt>
+          <cx:pt idx="98">15</cx:pt>
+          <cx:pt idx="99">15</cx:pt>
+          <cx:pt idx="100">15</cx:pt>
+          <cx:pt idx="101">15</cx:pt>
+          <cx:pt idx="102">15</cx:pt>
+          <cx:pt idx="103">15</cx:pt>
+          <cx:pt idx="104">15</cx:pt>
+          <cx:pt idx="105">15</cx:pt>
+          <cx:pt idx="106">15</cx:pt>
+          <cx:pt idx="107">15</cx:pt>
+          <cx:pt idx="108">15</cx:pt>
+          <cx:pt idx="109">15</cx:pt>
+          <cx:pt idx="110">15</cx:pt>
+          <cx:pt idx="111">15</cx:pt>
+          <cx:pt idx="112">15</cx:pt>
+          <cx:pt idx="113">15</cx:pt>
+          <cx:pt idx="114">15</cx:pt>
+          <cx:pt idx="115">15</cx:pt>
+          <cx:pt idx="116">15</cx:pt>
+          <cx:pt idx="117">15</cx:pt>
+          <cx:pt idx="118">15</cx:pt>
+          <cx:pt idx="119">15</cx:pt>
+          <cx:pt idx="120">15</cx:pt>
+          <cx:pt idx="121">15</cx:pt>
+          <cx:pt idx="122">15</cx:pt>
+          <cx:pt idx="123">15</cx:pt>
+          <cx:pt idx="124">15</cx:pt>
+          <cx:pt idx="125">15</cx:pt>
+          <cx:pt idx="126">15</cx:pt>
+          <cx:pt idx="127">15</cx:pt>
+          <cx:pt idx="128">15</cx:pt>
+          <cx:pt idx="129">15</cx:pt>
+          <cx:pt idx="130">15</cx:pt>
+          <cx:pt idx="131">15</cx:pt>
+          <cx:pt idx="132">15</cx:pt>
+          <cx:pt idx="133">15</cx:pt>
+          <cx:pt idx="134">15</cx:pt>
+          <cx:pt idx="135">15</cx:pt>
+          <cx:pt idx="136">15</cx:pt>
+          <cx:pt idx="137">15</cx:pt>
+          <cx:pt idx="138">15</cx:pt>
+          <cx:pt idx="139">15</cx:pt>
+          <cx:pt idx="140">15</cx:pt>
+          <cx:pt idx="141">15</cx:pt>
+          <cx:pt idx="142">15</cx:pt>
+          <cx:pt idx="143">15</cx:pt>
+          <cx:pt idx="144">15</cx:pt>
+          <cx:pt idx="145">15</cx:pt>
+          <cx:pt idx="146">15</cx:pt>
+          <cx:pt idx="147">15</cx:pt>
+          <cx:pt idx="148">15</cx:pt>
+          <cx:pt idx="149">15</cx:pt>
+          <cx:pt idx="150">15</cx:pt>
+          <cx:pt idx="151">15</cx:pt>
+          <cx:pt idx="152">15</cx:pt>
+          <cx:pt idx="153">15</cx:pt>
+          <cx:pt idx="154">15</cx:pt>
+          <cx:pt idx="155">15</cx:pt>
+          <cx:pt idx="156">15</cx:pt>
+          <cx:pt idx="157">15</cx:pt>
+          <cx:pt idx="158">15</cx:pt>
+          <cx:pt idx="159">15</cx:pt>
+          <cx:pt idx="160">15</cx:pt>
+          <cx:pt idx="161">15</cx:pt>
+          <cx:pt idx="162">15</cx:pt>
+          <cx:pt idx="163">15</cx:pt>
+          <cx:pt idx="164">15</cx:pt>
+          <cx:pt idx="165">15</cx:pt>
+          <cx:pt idx="166">15</cx:pt>
+          <cx:pt idx="167">15</cx:pt>
+          <cx:pt idx="168">15</cx:pt>
+          <cx:pt idx="169">15</cx:pt>
+          <cx:pt idx="170">14</cx:pt>
+          <cx:pt idx="171">14</cx:pt>
+          <cx:pt idx="172">14</cx:pt>
+          <cx:pt idx="173">14</cx:pt>
+          <cx:pt idx="174">14</cx:pt>
+          <cx:pt idx="175">14</cx:pt>
+          <cx:pt idx="176">14</cx:pt>
+          <cx:pt idx="177">14</cx:pt>
+          <cx:pt idx="178">14</cx:pt>
+          <cx:pt idx="179">14</cx:pt>
+          <cx:pt idx="180">14</cx:pt>
+          <cx:pt idx="181">14</cx:pt>
+          <cx:pt idx="182">14</cx:pt>
+          <cx:pt idx="183">14</cx:pt>
+          <cx:pt idx="184">14</cx:pt>
+          <cx:pt idx="185">14</cx:pt>
+          <cx:pt idx="186">14</cx:pt>
+          <cx:pt idx="187">14</cx:pt>
+          <cx:pt idx="188">14</cx:pt>
+          <cx:pt idx="189">14</cx:pt>
+          <cx:pt idx="190">14</cx:pt>
+          <cx:pt idx="191">14</cx:pt>
+          <cx:pt idx="192">14</cx:pt>
+          <cx:pt idx="193">14</cx:pt>
+          <cx:pt idx="194">14</cx:pt>
+          <cx:pt idx="195">14</cx:pt>
+          <cx:pt idx="196">14</cx:pt>
+          <cx:pt idx="197">14</cx:pt>
+          <cx:pt idx="198">14</cx:pt>
+          <cx:pt idx="199">14</cx:pt>
+          <cx:pt idx="200">14</cx:pt>
+          <cx:pt idx="201">14</cx:pt>
+          <cx:pt idx="202">14</cx:pt>
+          <cx:pt idx="203">14</cx:pt>
+          <cx:pt idx="204">14</cx:pt>
+          <cx:pt idx="205">14</cx:pt>
+          <cx:pt idx="206">14</cx:pt>
+          <cx:pt idx="207">14</cx:pt>
+          <cx:pt idx="208">14</cx:pt>
+          <cx:pt idx="209">14</cx:pt>
+          <cx:pt idx="210">14</cx:pt>
+          <cx:pt idx="211">14</cx:pt>
+          <cx:pt idx="212">14</cx:pt>
+          <cx:pt idx="213">14</cx:pt>
+          <cx:pt idx="214">14</cx:pt>
+          <cx:pt idx="215">14</cx:pt>
+          <cx:pt idx="216">14</cx:pt>
+          <cx:pt idx="217">14</cx:pt>
+          <cx:pt idx="218">14</cx:pt>
+          <cx:pt idx="219">14</cx:pt>
+          <cx:pt idx="220">14</cx:pt>
+          <cx:pt idx="221">14</cx:pt>
+          <cx:pt idx="222">14</cx:pt>
+          <cx:pt idx="223">14</cx:pt>
+          <cx:pt idx="224">14</cx:pt>
+          <cx:pt idx="225">14</cx:pt>
+          <cx:pt idx="226">14</cx:pt>
+          <cx:pt idx="227">14</cx:pt>
+          <cx:pt idx="228">14</cx:pt>
+          <cx:pt idx="229">14</cx:pt>
+          <cx:pt idx="230">14</cx:pt>
+          <cx:pt idx="231">14</cx:pt>
+          <cx:pt idx="232">13</cx:pt>
+          <cx:pt idx="233">13</cx:pt>
+          <cx:pt idx="234">13</cx:pt>
+          <cx:pt idx="235">13</cx:pt>
+          <cx:pt idx="236">13</cx:pt>
+          <cx:pt idx="237">13</cx:pt>
+          <cx:pt idx="238">13</cx:pt>
+          <cx:pt idx="239">13</cx:pt>
+          <cx:pt idx="240">13</cx:pt>
+          <cx:pt idx="241">13</cx:pt>
+          <cx:pt idx="242">13</cx:pt>
+          <cx:pt idx="243">13</cx:pt>
+          <cx:pt idx="244">13</cx:pt>
+          <cx:pt idx="245">13</cx:pt>
+          <cx:pt idx="246">13</cx:pt>
+          <cx:pt idx="247">13</cx:pt>
+          <cx:pt idx="248">13</cx:pt>
+          <cx:pt idx="249">13</cx:pt>
+          <cx:pt idx="250">13</cx:pt>
+          <cx:pt idx="251">13</cx:pt>
+          <cx:pt idx="252">13</cx:pt>
+          <cx:pt idx="253">13</cx:pt>
+          <cx:pt idx="254">13</cx:pt>
+          <cx:pt idx="255">13</cx:pt>
+          <cx:pt idx="256">13</cx:pt>
+          <cx:pt idx="257">13</cx:pt>
         </cx:lvl>
       </cx:numDim>
     </cx:data>
     <cx:data id="2">
       <cx:numDim type="val">
-        <cx:f>Sheet1!$C$2:$C$9</cx:f>
-        <cx:lvl ptCount="8" formatCode="G/標準">
-          <cx:pt idx="0">12</cx:pt>
-          <cx:pt idx="1">11</cx:pt>
-          <cx:pt idx="2">12</cx:pt>
-          <cx:pt idx="3">14</cx:pt>
-          <cx:pt idx="4">17</cx:pt>
-          <cx:pt idx="5">35</cx:pt>
-          <cx:pt idx="6">9</cx:pt>
-          <cx:pt idx="7">24</cx:pt>
+        <cx:f>Sheet1!$C$2:$C$371</cx:f>
+        <cx:lvl ptCount="370" formatCode="G/標準">
+          <cx:pt idx="0">35</cx:pt>
+          <cx:pt idx="1">35</cx:pt>
+          <cx:pt idx="2">29</cx:pt>
+          <cx:pt idx="3">29</cx:pt>
+          <cx:pt idx="4">27</cx:pt>
+          <cx:pt idx="5">27</cx:pt>
+          <cx:pt idx="6">27</cx:pt>
+          <cx:pt idx="7">27</cx:pt>
+          <cx:pt idx="8">27</cx:pt>
+          <cx:pt idx="9">27</cx:pt>
+          <cx:pt idx="10">25</cx:pt>
+          <cx:pt idx="11">25</cx:pt>
+          <cx:pt idx="12">25</cx:pt>
+          <cx:pt idx="13">25</cx:pt>
+          <cx:pt idx="14">25</cx:pt>
+          <cx:pt idx="15">25</cx:pt>
+          <cx:pt idx="16">25</cx:pt>
+          <cx:pt idx="17">25</cx:pt>
+          <cx:pt idx="18">24</cx:pt>
+          <cx:pt idx="19">24</cx:pt>
+          <cx:pt idx="20">24</cx:pt>
+          <cx:pt idx="21">24</cx:pt>
+          <cx:pt idx="22">24</cx:pt>
+          <cx:pt idx="23">24</cx:pt>
+          <cx:pt idx="24">24</cx:pt>
+          <cx:pt idx="25">24</cx:pt>
+          <cx:pt idx="26">24</cx:pt>
+          <cx:pt idx="27">24</cx:pt>
+          <cx:pt idx="28">24</cx:pt>
+          <cx:pt idx="29">24</cx:pt>
+          <cx:pt idx="30">24</cx:pt>
+          <cx:pt idx="31">24</cx:pt>
+          <cx:pt idx="32">23</cx:pt>
+          <cx:pt idx="33">23</cx:pt>
+          <cx:pt idx="34">23</cx:pt>
+          <cx:pt idx="35">23</cx:pt>
+          <cx:pt idx="36">23</cx:pt>
+          <cx:pt idx="37">23</cx:pt>
+          <cx:pt idx="38">23</cx:pt>
+          <cx:pt idx="39">23</cx:pt>
+          <cx:pt idx="40">23</cx:pt>
+          <cx:pt idx="41">23</cx:pt>
+          <cx:pt idx="42">23</cx:pt>
+          <cx:pt idx="43">23</cx:pt>
+          <cx:pt idx="44">22</cx:pt>
+          <cx:pt idx="45">22</cx:pt>
+          <cx:pt idx="46">22</cx:pt>
+          <cx:pt idx="47">22</cx:pt>
+          <cx:pt idx="48">22</cx:pt>
+          <cx:pt idx="49">22</cx:pt>
+          <cx:pt idx="50">22</cx:pt>
+          <cx:pt idx="51">22</cx:pt>
+          <cx:pt idx="52">21</cx:pt>
+          <cx:pt idx="53">21</cx:pt>
+          <cx:pt idx="54">21</cx:pt>
+          <cx:pt idx="55">21</cx:pt>
+          <cx:pt idx="56">21</cx:pt>
+          <cx:pt idx="57">21</cx:pt>
+          <cx:pt idx="58">20</cx:pt>
+          <cx:pt idx="59">20</cx:pt>
+          <cx:pt idx="60">20</cx:pt>
+          <cx:pt idx="61">20</cx:pt>
+          <cx:pt idx="62">20</cx:pt>
+          <cx:pt idx="63">20</cx:pt>
+          <cx:pt idx="64">19</cx:pt>
+          <cx:pt idx="65">19</cx:pt>
+          <cx:pt idx="66">19</cx:pt>
+          <cx:pt idx="67">19</cx:pt>
+          <cx:pt idx="68">19</cx:pt>
+          <cx:pt idx="69">19</cx:pt>
+          <cx:pt idx="70">19</cx:pt>
+          <cx:pt idx="71">19</cx:pt>
+          <cx:pt idx="72">19</cx:pt>
+          <cx:pt idx="73">19</cx:pt>
+          <cx:pt idx="74">19</cx:pt>
+          <cx:pt idx="75">19</cx:pt>
+          <cx:pt idx="76">19</cx:pt>
+          <cx:pt idx="77">19</cx:pt>
+          <cx:pt idx="78">18</cx:pt>
+          <cx:pt idx="79">18</cx:pt>
+          <cx:pt idx="80">18</cx:pt>
+          <cx:pt idx="81">18</cx:pt>
+          <cx:pt idx="82">18</cx:pt>
+          <cx:pt idx="83">18</cx:pt>
+          <cx:pt idx="84">18</cx:pt>
+          <cx:pt idx="85">18</cx:pt>
+          <cx:pt idx="86">18</cx:pt>
+          <cx:pt idx="87">18</cx:pt>
+          <cx:pt idx="88">18</cx:pt>
+          <cx:pt idx="89">18</cx:pt>
+          <cx:pt idx="90">18</cx:pt>
+          <cx:pt idx="91">18</cx:pt>
+          <cx:pt idx="92">18</cx:pt>
+          <cx:pt idx="93">18</cx:pt>
+          <cx:pt idx="94">18</cx:pt>
+          <cx:pt idx="95">18</cx:pt>
+          <cx:pt idx="96">18</cx:pt>
+          <cx:pt idx="97">18</cx:pt>
+          <cx:pt idx="98">18</cx:pt>
+          <cx:pt idx="99">18</cx:pt>
+          <cx:pt idx="100">18</cx:pt>
+          <cx:pt idx="101">18</cx:pt>
+          <cx:pt idx="102">18</cx:pt>
+          <cx:pt idx="103">18</cx:pt>
+          <cx:pt idx="104">18</cx:pt>
+          <cx:pt idx="105">18</cx:pt>
+          <cx:pt idx="106">18</cx:pt>
+          <cx:pt idx="107">18</cx:pt>
+          <cx:pt idx="108">18</cx:pt>
+          <cx:pt idx="109">18</cx:pt>
+          <cx:pt idx="110">18</cx:pt>
+          <cx:pt idx="111">18</cx:pt>
+          <cx:pt idx="112">18</cx:pt>
+          <cx:pt idx="113">18</cx:pt>
+          <cx:pt idx="114">18</cx:pt>
+          <cx:pt idx="115">18</cx:pt>
+          <cx:pt idx="116">18</cx:pt>
+          <cx:pt idx="117">18</cx:pt>
+          <cx:pt idx="118">18</cx:pt>
+          <cx:pt idx="119">18</cx:pt>
+          <cx:pt idx="120">18</cx:pt>
+          <cx:pt idx="121">18</cx:pt>
+          <cx:pt idx="122">18</cx:pt>
+          <cx:pt idx="123">18</cx:pt>
+          <cx:pt idx="124">18</cx:pt>
+          <cx:pt idx="125">18</cx:pt>
+          <cx:pt idx="126">17</cx:pt>
+          <cx:pt idx="127">17</cx:pt>
+          <cx:pt idx="128">17</cx:pt>
+          <cx:pt idx="129">17</cx:pt>
+          <cx:pt idx="130">17</cx:pt>
+          <cx:pt idx="131">17</cx:pt>
+          <cx:pt idx="132">17</cx:pt>
+          <cx:pt idx="133">17</cx:pt>
+          <cx:pt idx="134">17</cx:pt>
+          <cx:pt idx="135">17</cx:pt>
+          <cx:pt idx="136">17</cx:pt>
+          <cx:pt idx="137">17</cx:pt>
+          <cx:pt idx="138">17</cx:pt>
+          <cx:pt idx="139">17</cx:pt>
+          <cx:pt idx="140">17</cx:pt>
+          <cx:pt idx="141">17</cx:pt>
+          <cx:pt idx="142">17</cx:pt>
+          <cx:pt idx="143">17</cx:pt>
+          <cx:pt idx="144">17</cx:pt>
+          <cx:pt idx="145">17</cx:pt>
+          <cx:pt idx="146">17</cx:pt>
+          <cx:pt idx="147">17</cx:pt>
+          <cx:pt idx="148">17</cx:pt>
+          <cx:pt idx="149">17</cx:pt>
+          <cx:pt idx="150">17</cx:pt>
+          <cx:pt idx="151">17</cx:pt>
+          <cx:pt idx="152">17</cx:pt>
+          <cx:pt idx="153">17</cx:pt>
+          <cx:pt idx="154">17</cx:pt>
+          <cx:pt idx="155">17</cx:pt>
+          <cx:pt idx="156">17</cx:pt>
+          <cx:pt idx="157">17</cx:pt>
+          <cx:pt idx="158">17</cx:pt>
+          <cx:pt idx="159">17</cx:pt>
+          <cx:pt idx="160">17</cx:pt>
+          <cx:pt idx="161">17</cx:pt>
+          <cx:pt idx="162">17</cx:pt>
+          <cx:pt idx="163">17</cx:pt>
+          <cx:pt idx="164">17</cx:pt>
+          <cx:pt idx="165">17</cx:pt>
+          <cx:pt idx="166">17</cx:pt>
+          <cx:pt idx="167">17</cx:pt>
+          <cx:pt idx="168">17</cx:pt>
+          <cx:pt idx="169">17</cx:pt>
+          <cx:pt idx="170">17</cx:pt>
+          <cx:pt idx="171">17</cx:pt>
+          <cx:pt idx="172">17</cx:pt>
+          <cx:pt idx="173">17</cx:pt>
+          <cx:pt idx="174">17</cx:pt>
+          <cx:pt idx="175">17</cx:pt>
+          <cx:pt idx="176">17</cx:pt>
+          <cx:pt idx="177">17</cx:pt>
+          <cx:pt idx="178">17</cx:pt>
+          <cx:pt idx="179">17</cx:pt>
+          <cx:pt idx="180">17</cx:pt>
+          <cx:pt idx="181">17</cx:pt>
+          <cx:pt idx="182">17</cx:pt>
+          <cx:pt idx="183">17</cx:pt>
+          <cx:pt idx="184">17</cx:pt>
+          <cx:pt idx="185">17</cx:pt>
+          <cx:pt idx="186">17</cx:pt>
+          <cx:pt idx="187">17</cx:pt>
+          <cx:pt idx="188">17</cx:pt>
+          <cx:pt idx="189">17</cx:pt>
+          <cx:pt idx="190">17</cx:pt>
+          <cx:pt idx="191">17</cx:pt>
+          <cx:pt idx="192">16</cx:pt>
+          <cx:pt idx="193">16</cx:pt>
+          <cx:pt idx="194">16</cx:pt>
+          <cx:pt idx="195">16</cx:pt>
+          <cx:pt idx="196">16</cx:pt>
+          <cx:pt idx="197">16</cx:pt>
+          <cx:pt idx="198">16</cx:pt>
+          <cx:pt idx="199">16</cx:pt>
+          <cx:pt idx="200">16</cx:pt>
+          <cx:pt idx="201">16</cx:pt>
+          <cx:pt idx="202">16</cx:pt>
+          <cx:pt idx="203">16</cx:pt>
+          <cx:pt idx="204">16</cx:pt>
+          <cx:pt idx="205">16</cx:pt>
+          <cx:pt idx="206">16</cx:pt>
+          <cx:pt idx="207">16</cx:pt>
+          <cx:pt idx="208">16</cx:pt>
+          <cx:pt idx="209">16</cx:pt>
+          <cx:pt idx="210">16</cx:pt>
+          <cx:pt idx="211">16</cx:pt>
+          <cx:pt idx="212">16</cx:pt>
+          <cx:pt idx="213">16</cx:pt>
+          <cx:pt idx="214">16</cx:pt>
+          <cx:pt idx="215">16</cx:pt>
+          <cx:pt idx="216">16</cx:pt>
+          <cx:pt idx="217">16</cx:pt>
+          <cx:pt idx="218">16</cx:pt>
+          <cx:pt idx="219">16</cx:pt>
+          <cx:pt idx="220">16</cx:pt>
+          <cx:pt idx="221">16</cx:pt>
+          <cx:pt idx="222">16</cx:pt>
+          <cx:pt idx="223">16</cx:pt>
+          <cx:pt idx="224">16</cx:pt>
+          <cx:pt idx="225">16</cx:pt>
+          <cx:pt idx="226">16</cx:pt>
+          <cx:pt idx="227">16</cx:pt>
+          <cx:pt idx="228">16</cx:pt>
+          <cx:pt idx="229">16</cx:pt>
+          <cx:pt idx="230">16</cx:pt>
+          <cx:pt idx="231">16</cx:pt>
+          <cx:pt idx="232">16</cx:pt>
+          <cx:pt idx="233">16</cx:pt>
+          <cx:pt idx="234">16</cx:pt>
+          <cx:pt idx="235">16</cx:pt>
+          <cx:pt idx="236">16</cx:pt>
+          <cx:pt idx="237">16</cx:pt>
+          <cx:pt idx="238">16</cx:pt>
+          <cx:pt idx="239">16</cx:pt>
+          <cx:pt idx="240">16</cx:pt>
+          <cx:pt idx="241">16</cx:pt>
+          <cx:pt idx="242">16</cx:pt>
+          <cx:pt idx="243">16</cx:pt>
+          <cx:pt idx="244">16</cx:pt>
+          <cx:pt idx="245">16</cx:pt>
+          <cx:pt idx="246">16</cx:pt>
+          <cx:pt idx="247">16</cx:pt>
+          <cx:pt idx="248">16</cx:pt>
+          <cx:pt idx="249">16</cx:pt>
+          <cx:pt idx="250">16</cx:pt>
+          <cx:pt idx="251">16</cx:pt>
+          <cx:pt idx="252">16</cx:pt>
+          <cx:pt idx="253">16</cx:pt>
+          <cx:pt idx="254">16</cx:pt>
+          <cx:pt idx="255">16</cx:pt>
+          <cx:pt idx="256">16</cx:pt>
+          <cx:pt idx="257">16</cx:pt>
+          <cx:pt idx="258">16</cx:pt>
+          <cx:pt idx="259">16</cx:pt>
+          <cx:pt idx="260">16</cx:pt>
+          <cx:pt idx="261">16</cx:pt>
+          <cx:pt idx="262">16</cx:pt>
+          <cx:pt idx="263">16</cx:pt>
+          <cx:pt idx="264">16</cx:pt>
+          <cx:pt idx="265">16</cx:pt>
+          <cx:pt idx="266">16</cx:pt>
+          <cx:pt idx="267">16</cx:pt>
+          <cx:pt idx="268">16</cx:pt>
+          <cx:pt idx="269">16</cx:pt>
+          <cx:pt idx="270">16</cx:pt>
+          <cx:pt idx="271">16</cx:pt>
+          <cx:pt idx="272">16</cx:pt>
+          <cx:pt idx="273">16</cx:pt>
+          <cx:pt idx="274">16</cx:pt>
+          <cx:pt idx="275">16</cx:pt>
+          <cx:pt idx="276">15</cx:pt>
+          <cx:pt idx="277">15</cx:pt>
+          <cx:pt idx="278">15</cx:pt>
+          <cx:pt idx="279">15</cx:pt>
+          <cx:pt idx="280">15</cx:pt>
+          <cx:pt idx="281">15</cx:pt>
+          <cx:pt idx="282">15</cx:pt>
+          <cx:pt idx="283">15</cx:pt>
+          <cx:pt idx="284">15</cx:pt>
+          <cx:pt idx="285">15</cx:pt>
+          <cx:pt idx="286">15</cx:pt>
+          <cx:pt idx="287">15</cx:pt>
+          <cx:pt idx="288">15</cx:pt>
+          <cx:pt idx="289">15</cx:pt>
+          <cx:pt idx="290">15</cx:pt>
+          <cx:pt idx="291">15</cx:pt>
+          <cx:pt idx="292">15</cx:pt>
+          <cx:pt idx="293">15</cx:pt>
+          <cx:pt idx="294">15</cx:pt>
+          <cx:pt idx="295">15</cx:pt>
+          <cx:pt idx="296">15</cx:pt>
+          <cx:pt idx="297">15</cx:pt>
+          <cx:pt idx="298">15</cx:pt>
+          <cx:pt idx="299">15</cx:pt>
+          <cx:pt idx="300">15</cx:pt>
+          <cx:pt idx="301">15</cx:pt>
+          <cx:pt idx="302">15</cx:pt>
+          <cx:pt idx="303">15</cx:pt>
+          <cx:pt idx="304">15</cx:pt>
+          <cx:pt idx="305">15</cx:pt>
+          <cx:pt idx="306">15</cx:pt>
+          <cx:pt idx="307">15</cx:pt>
+          <cx:pt idx="308">15</cx:pt>
+          <cx:pt idx="309">15</cx:pt>
+          <cx:pt idx="310">15</cx:pt>
+          <cx:pt idx="311">15</cx:pt>
+          <cx:pt idx="312">15</cx:pt>
+          <cx:pt idx="313">15</cx:pt>
+          <cx:pt idx="314">15</cx:pt>
+          <cx:pt idx="315">15</cx:pt>
+          <cx:pt idx="316">15</cx:pt>
+          <cx:pt idx="317">15</cx:pt>
+          <cx:pt idx="318">15</cx:pt>
+          <cx:pt idx="319">15</cx:pt>
+          <cx:pt idx="320">15</cx:pt>
+          <cx:pt idx="321">15</cx:pt>
+          <cx:pt idx="322">15</cx:pt>
+          <cx:pt idx="323">15</cx:pt>
+          <cx:pt idx="324">15</cx:pt>
+          <cx:pt idx="325">15</cx:pt>
+          <cx:pt idx="326">15</cx:pt>
+          <cx:pt idx="327">15</cx:pt>
+          <cx:pt idx="328">15</cx:pt>
+          <cx:pt idx="329">15</cx:pt>
+          <cx:pt idx="330">15</cx:pt>
+          <cx:pt idx="331">15</cx:pt>
+          <cx:pt idx="332">15</cx:pt>
+          <cx:pt idx="333">15</cx:pt>
+          <cx:pt idx="334">15</cx:pt>
+          <cx:pt idx="335">15</cx:pt>
+          <cx:pt idx="336">15</cx:pt>
+          <cx:pt idx="337">15</cx:pt>
+          <cx:pt idx="338">14</cx:pt>
+          <cx:pt idx="339">14</cx:pt>
+          <cx:pt idx="340">14</cx:pt>
+          <cx:pt idx="341">14</cx:pt>
+          <cx:pt idx="342">14</cx:pt>
+          <cx:pt idx="343">14</cx:pt>
+          <cx:pt idx="344">14</cx:pt>
+          <cx:pt idx="345">14</cx:pt>
+          <cx:pt idx="346">14</cx:pt>
+          <cx:pt idx="347">14</cx:pt>
+          <cx:pt idx="348">14</cx:pt>
+          <cx:pt idx="349">14</cx:pt>
+          <cx:pt idx="350">14</cx:pt>
+          <cx:pt idx="351">14</cx:pt>
+          <cx:pt idx="352">13</cx:pt>
+          <cx:pt idx="353">13</cx:pt>
+          <cx:pt idx="354">12</cx:pt>
+          <cx:pt idx="355">12</cx:pt>
+          <cx:pt idx="356">11</cx:pt>
+          <cx:pt idx="357">11</cx:pt>
+          <cx:pt idx="358">11</cx:pt>
+          <cx:pt idx="359">11</cx:pt>
+          <cx:pt idx="360">10</cx:pt>
+          <cx:pt idx="361">10</cx:pt>
         </cx:lvl>
       </cx:numDim>
     </cx:data>
     <cx:data id="3">
       <cx:numDim type="val">
-        <cx:f>Sheet1!$D$2:$D$9</cx:f>
-        <cx:lvl ptCount="8" formatCode="G/標準"/>
-      </cx:numDim>
-    </cx:data>
-    <cx:data id="4">
-      <cx:numDim type="val">
-        <cx:f>Sheet1!$E$2:$E$9</cx:f>
-        <cx:lvl ptCount="8" formatCode="G/標準">
-          <cx:pt idx="0">10</cx:pt>
-          <cx:pt idx="1">10</cx:pt>
-          <cx:pt idx="2">13</cx:pt>
-          <cx:pt idx="3">12</cx:pt>
-          <cx:pt idx="4">14</cx:pt>
+        <cx:f>Sheet1!$D$2:$D$371</cx:f>
+        <cx:lvl ptCount="370" formatCode="G/標準">
+          <cx:pt idx="0">35</cx:pt>
+          <cx:pt idx="1">35</cx:pt>
+          <cx:pt idx="2">33</cx:pt>
+          <cx:pt idx="3">33</cx:pt>
+          <cx:pt idx="4">30</cx:pt>
           <cx:pt idx="5">30</cx:pt>
-          <cx:pt idx="6">1</cx:pt>
-          <cx:pt idx="7">20</cx:pt>
-        </cx:lvl>
-      </cx:numDim>
-    </cx:data>
-    <cx:data id="5">
-      <cx:numDim type="val">
-        <cx:f>Sheet1!$F$2:$F$9</cx:f>
-        <cx:lvl ptCount="8" formatCode="G/標準">
-          <cx:pt idx="0">12</cx:pt>
-          <cx:pt idx="1">11</cx:pt>
-          <cx:pt idx="2">12</cx:pt>
-          <cx:pt idx="3">14</cx:pt>
-          <cx:pt idx="4">17</cx:pt>
-          <cx:pt idx="5">35</cx:pt>
-          <cx:pt idx="6">9</cx:pt>
-          <cx:pt idx="7">24</cx:pt>
+          <cx:pt idx="6">27</cx:pt>
+          <cx:pt idx="7">27</cx:pt>
+          <cx:pt idx="8">26</cx:pt>
+          <cx:pt idx="9">26</cx:pt>
+          <cx:pt idx="10">25</cx:pt>
+          <cx:pt idx="11">25</cx:pt>
+          <cx:pt idx="12">25</cx:pt>
+          <cx:pt idx="13">25</cx:pt>
+          <cx:pt idx="14">25</cx:pt>
+          <cx:pt idx="15">25</cx:pt>
+          <cx:pt idx="16">25</cx:pt>
+          <cx:pt idx="17">25</cx:pt>
+          <cx:pt idx="18">24</cx:pt>
+          <cx:pt idx="19">24</cx:pt>
+          <cx:pt idx="20">24</cx:pt>
+          <cx:pt idx="21">24</cx:pt>
+          <cx:pt idx="22">24</cx:pt>
+          <cx:pt idx="23">24</cx:pt>
+          <cx:pt idx="24">24</cx:pt>
+          <cx:pt idx="25">24</cx:pt>
+          <cx:pt idx="26">24</cx:pt>
+          <cx:pt idx="27">24</cx:pt>
+          <cx:pt idx="28">24</cx:pt>
+          <cx:pt idx="29">24</cx:pt>
+          <cx:pt idx="30">23</cx:pt>
+          <cx:pt idx="31">23</cx:pt>
+          <cx:pt idx="32">23</cx:pt>
+          <cx:pt idx="33">23</cx:pt>
+          <cx:pt idx="34">23</cx:pt>
+          <cx:pt idx="35">23</cx:pt>
+          <cx:pt idx="36">23</cx:pt>
+          <cx:pt idx="37">23</cx:pt>
+          <cx:pt idx="38">23</cx:pt>
+          <cx:pt idx="39">23</cx:pt>
+          <cx:pt idx="40">23</cx:pt>
+          <cx:pt idx="41">23</cx:pt>
+          <cx:pt idx="42">22</cx:pt>
+          <cx:pt idx="43">22</cx:pt>
+          <cx:pt idx="44">22</cx:pt>
+          <cx:pt idx="45">22</cx:pt>
+          <cx:pt idx="46">22</cx:pt>
+          <cx:pt idx="47">22</cx:pt>
+          <cx:pt idx="48">22</cx:pt>
+          <cx:pt idx="49">22</cx:pt>
+          <cx:pt idx="50">22</cx:pt>
+          <cx:pt idx="51">22</cx:pt>
+          <cx:pt idx="52">22</cx:pt>
+          <cx:pt idx="53">22</cx:pt>
+          <cx:pt idx="54">22</cx:pt>
+          <cx:pt idx="55">22</cx:pt>
+          <cx:pt idx="56">22</cx:pt>
+          <cx:pt idx="57">22</cx:pt>
+          <cx:pt idx="58">22</cx:pt>
+          <cx:pt idx="59">22</cx:pt>
+          <cx:pt idx="60">22</cx:pt>
+          <cx:pt idx="61">22</cx:pt>
+          <cx:pt idx="62">21</cx:pt>
+          <cx:pt idx="63">21</cx:pt>
+          <cx:pt idx="64">21</cx:pt>
+          <cx:pt idx="65">21</cx:pt>
+          <cx:pt idx="66">21</cx:pt>
+          <cx:pt idx="67">21</cx:pt>
+          <cx:pt idx="68">21</cx:pt>
+          <cx:pt idx="69">21</cx:pt>
+          <cx:pt idx="70">21</cx:pt>
+          <cx:pt idx="71">21</cx:pt>
+          <cx:pt idx="72">20</cx:pt>
+          <cx:pt idx="73">20</cx:pt>
+          <cx:pt idx="74">20</cx:pt>
+          <cx:pt idx="75">20</cx:pt>
+          <cx:pt idx="76">20</cx:pt>
+          <cx:pt idx="77">20</cx:pt>
+          <cx:pt idx="78">20</cx:pt>
+          <cx:pt idx="79">20</cx:pt>
+          <cx:pt idx="80">20</cx:pt>
+          <cx:pt idx="81">20</cx:pt>
+          <cx:pt idx="82">20</cx:pt>
+          <cx:pt idx="83">20</cx:pt>
+          <cx:pt idx="84">20</cx:pt>
+          <cx:pt idx="85">20</cx:pt>
+          <cx:pt idx="86">19</cx:pt>
+          <cx:pt idx="87">19</cx:pt>
+          <cx:pt idx="88">19</cx:pt>
+          <cx:pt idx="89">19</cx:pt>
+          <cx:pt idx="90">19</cx:pt>
+          <cx:pt idx="91">19</cx:pt>
+          <cx:pt idx="92">19</cx:pt>
+          <cx:pt idx="93">19</cx:pt>
+          <cx:pt idx="94">19</cx:pt>
+          <cx:pt idx="95">19</cx:pt>
+          <cx:pt idx="96">19</cx:pt>
+          <cx:pt idx="97">19</cx:pt>
+          <cx:pt idx="98">19</cx:pt>
+          <cx:pt idx="99">19</cx:pt>
+          <cx:pt idx="100">19</cx:pt>
+          <cx:pt idx="101">19</cx:pt>
+          <cx:pt idx="102">19</cx:pt>
+          <cx:pt idx="103">19</cx:pt>
+          <cx:pt idx="104">19</cx:pt>
+          <cx:pt idx="105">19</cx:pt>
+          <cx:pt idx="106">19</cx:pt>
+          <cx:pt idx="107">19</cx:pt>
+          <cx:pt idx="108">19</cx:pt>
+          <cx:pt idx="109">19</cx:pt>
+          <cx:pt idx="110">19</cx:pt>
+          <cx:pt idx="111">19</cx:pt>
+          <cx:pt idx="112">19</cx:pt>
+          <cx:pt idx="113">19</cx:pt>
+          <cx:pt idx="114">19</cx:pt>
+          <cx:pt idx="115">19</cx:pt>
+          <cx:pt idx="116">19</cx:pt>
+          <cx:pt idx="117">19</cx:pt>
+          <cx:pt idx="118">19</cx:pt>
+          <cx:pt idx="119">19</cx:pt>
+          <cx:pt idx="120">18</cx:pt>
+          <cx:pt idx="121">18</cx:pt>
+          <cx:pt idx="122">18</cx:pt>
+          <cx:pt idx="123">18</cx:pt>
+          <cx:pt idx="124">18</cx:pt>
+          <cx:pt idx="125">18</cx:pt>
+          <cx:pt idx="126">18</cx:pt>
+          <cx:pt idx="127">18</cx:pt>
+          <cx:pt idx="128">18</cx:pt>
+          <cx:pt idx="129">18</cx:pt>
+          <cx:pt idx="130">18</cx:pt>
+          <cx:pt idx="131">18</cx:pt>
+          <cx:pt idx="132">18</cx:pt>
+          <cx:pt idx="133">18</cx:pt>
+          <cx:pt idx="134">18</cx:pt>
+          <cx:pt idx="135">18</cx:pt>
+          <cx:pt idx="136">18</cx:pt>
+          <cx:pt idx="137">18</cx:pt>
+          <cx:pt idx="138">18</cx:pt>
+          <cx:pt idx="139">18</cx:pt>
+          <cx:pt idx="140">18</cx:pt>
+          <cx:pt idx="141">18</cx:pt>
+          <cx:pt idx="142">18</cx:pt>
+          <cx:pt idx="143">18</cx:pt>
+          <cx:pt idx="144">18</cx:pt>
+          <cx:pt idx="145">18</cx:pt>
+          <cx:pt idx="146">18</cx:pt>
+          <cx:pt idx="147">18</cx:pt>
+          <cx:pt idx="148">18</cx:pt>
+          <cx:pt idx="149">18</cx:pt>
+          <cx:pt idx="150">18</cx:pt>
+          <cx:pt idx="151">18</cx:pt>
+          <cx:pt idx="152">18</cx:pt>
+          <cx:pt idx="153">18</cx:pt>
+          <cx:pt idx="154">18</cx:pt>
+          <cx:pt idx="155">18</cx:pt>
+          <cx:pt idx="156">18</cx:pt>
+          <cx:pt idx="157">18</cx:pt>
+          <cx:pt idx="158">18</cx:pt>
+          <cx:pt idx="159">18</cx:pt>
+          <cx:pt idx="160">18</cx:pt>
+          <cx:pt idx="161">18</cx:pt>
+          <cx:pt idx="162">18</cx:pt>
+          <cx:pt idx="163">18</cx:pt>
+          <cx:pt idx="164">18</cx:pt>
+          <cx:pt idx="165">18</cx:pt>
+          <cx:pt idx="166">17</cx:pt>
+          <cx:pt idx="167">17</cx:pt>
+          <cx:pt idx="168">17</cx:pt>
+          <cx:pt idx="169">17</cx:pt>
+          <cx:pt idx="170">17</cx:pt>
+          <cx:pt idx="171">17</cx:pt>
+          <cx:pt idx="172">17</cx:pt>
+          <cx:pt idx="173">17</cx:pt>
+          <cx:pt idx="174">17</cx:pt>
+          <cx:pt idx="175">17</cx:pt>
+          <cx:pt idx="176">17</cx:pt>
+          <cx:pt idx="177">17</cx:pt>
+          <cx:pt idx="178">17</cx:pt>
+          <cx:pt idx="179">17</cx:pt>
+          <cx:pt idx="180">17</cx:pt>
+          <cx:pt idx="181">17</cx:pt>
+          <cx:pt idx="182">17</cx:pt>
+          <cx:pt idx="183">17</cx:pt>
+          <cx:pt idx="184">17</cx:pt>
+          <cx:pt idx="185">17</cx:pt>
+          <cx:pt idx="186">17</cx:pt>
+          <cx:pt idx="187">17</cx:pt>
+          <cx:pt idx="188">17</cx:pt>
+          <cx:pt idx="189">17</cx:pt>
+          <cx:pt idx="190">17</cx:pt>
+          <cx:pt idx="191">17</cx:pt>
+          <cx:pt idx="192">17</cx:pt>
+          <cx:pt idx="193">17</cx:pt>
+          <cx:pt idx="194">17</cx:pt>
+          <cx:pt idx="195">17</cx:pt>
+          <cx:pt idx="196">17</cx:pt>
+          <cx:pt idx="197">17</cx:pt>
+          <cx:pt idx="198">17</cx:pt>
+          <cx:pt idx="199">17</cx:pt>
+          <cx:pt idx="200">17</cx:pt>
+          <cx:pt idx="201">17</cx:pt>
+          <cx:pt idx="202">17</cx:pt>
+          <cx:pt idx="203">17</cx:pt>
+          <cx:pt idx="204">17</cx:pt>
+          <cx:pt idx="205">17</cx:pt>
+          <cx:pt idx="206">17</cx:pt>
+          <cx:pt idx="207">17</cx:pt>
+          <cx:pt idx="208">17</cx:pt>
+          <cx:pt idx="209">17</cx:pt>
+          <cx:pt idx="210">17</cx:pt>
+          <cx:pt idx="211">17</cx:pt>
+          <cx:pt idx="212">17</cx:pt>
+          <cx:pt idx="213">17</cx:pt>
+          <cx:pt idx="214">17</cx:pt>
+          <cx:pt idx="215">17</cx:pt>
+          <cx:pt idx="216">17</cx:pt>
+          <cx:pt idx="217">17</cx:pt>
+          <cx:pt idx="218">17</cx:pt>
+          <cx:pt idx="219">17</cx:pt>
+          <cx:pt idx="220">17</cx:pt>
+          <cx:pt idx="221">17</cx:pt>
+          <cx:pt idx="222">17</cx:pt>
+          <cx:pt idx="223">17</cx:pt>
+          <cx:pt idx="224">17</cx:pt>
+          <cx:pt idx="225">17</cx:pt>
+          <cx:pt idx="226">17</cx:pt>
+          <cx:pt idx="227">17</cx:pt>
+          <cx:pt idx="228">17</cx:pt>
+          <cx:pt idx="229">17</cx:pt>
+          <cx:pt idx="230">16</cx:pt>
+          <cx:pt idx="231">16</cx:pt>
+          <cx:pt idx="232">16</cx:pt>
+          <cx:pt idx="233">16</cx:pt>
+          <cx:pt idx="234">16</cx:pt>
+          <cx:pt idx="235">16</cx:pt>
+          <cx:pt idx="236">16</cx:pt>
+          <cx:pt idx="237">16</cx:pt>
+          <cx:pt idx="238">16</cx:pt>
+          <cx:pt idx="239">16</cx:pt>
+          <cx:pt idx="240">16</cx:pt>
+          <cx:pt idx="241">16</cx:pt>
+          <cx:pt idx="242">16</cx:pt>
+          <cx:pt idx="243">16</cx:pt>
+          <cx:pt idx="244">16</cx:pt>
+          <cx:pt idx="245">16</cx:pt>
+          <cx:pt idx="246">16</cx:pt>
+          <cx:pt idx="247">16</cx:pt>
+          <cx:pt idx="248">16</cx:pt>
+          <cx:pt idx="249">16</cx:pt>
+          <cx:pt idx="250">16</cx:pt>
+          <cx:pt idx="251">16</cx:pt>
+          <cx:pt idx="252">16</cx:pt>
+          <cx:pt idx="253">16</cx:pt>
+          <cx:pt idx="254">16</cx:pt>
+          <cx:pt idx="255">16</cx:pt>
+          <cx:pt idx="256">16</cx:pt>
+          <cx:pt idx="257">16</cx:pt>
+          <cx:pt idx="258">16</cx:pt>
+          <cx:pt idx="259">16</cx:pt>
+          <cx:pt idx="260">16</cx:pt>
+          <cx:pt idx="261">16</cx:pt>
+          <cx:pt idx="262">16</cx:pt>
+          <cx:pt idx="263">16</cx:pt>
+          <cx:pt idx="264">16</cx:pt>
+          <cx:pt idx="265">16</cx:pt>
+          <cx:pt idx="266">16</cx:pt>
+          <cx:pt idx="267">16</cx:pt>
+          <cx:pt idx="268">16</cx:pt>
+          <cx:pt idx="269">16</cx:pt>
+          <cx:pt idx="270">16</cx:pt>
+          <cx:pt idx="271">16</cx:pt>
+          <cx:pt idx="272">16</cx:pt>
+          <cx:pt idx="273">16</cx:pt>
+          <cx:pt idx="274">16</cx:pt>
+          <cx:pt idx="275">16</cx:pt>
+          <cx:pt idx="276">15</cx:pt>
+          <cx:pt idx="277">15</cx:pt>
+          <cx:pt idx="278">15</cx:pt>
+          <cx:pt idx="279">15</cx:pt>
+          <cx:pt idx="280">15</cx:pt>
+          <cx:pt idx="281">15</cx:pt>
+          <cx:pt idx="282">15</cx:pt>
+          <cx:pt idx="283">15</cx:pt>
+          <cx:pt idx="284">15</cx:pt>
+          <cx:pt idx="285">15</cx:pt>
+          <cx:pt idx="286">15</cx:pt>
+          <cx:pt idx="287">15</cx:pt>
+          <cx:pt idx="288">15</cx:pt>
+          <cx:pt idx="289">15</cx:pt>
+          <cx:pt idx="290">15</cx:pt>
+          <cx:pt idx="291">15</cx:pt>
+          <cx:pt idx="292">15</cx:pt>
+          <cx:pt idx="293">15</cx:pt>
+          <cx:pt idx="294">15</cx:pt>
+          <cx:pt idx="295">15</cx:pt>
+          <cx:pt idx="296">15</cx:pt>
+          <cx:pt idx="297">15</cx:pt>
+          <cx:pt idx="298">15</cx:pt>
+          <cx:pt idx="299">15</cx:pt>
+          <cx:pt idx="300">14</cx:pt>
+          <cx:pt idx="301">14</cx:pt>
+          <cx:pt idx="302">14</cx:pt>
+          <cx:pt idx="303">14</cx:pt>
+          <cx:pt idx="304">14</cx:pt>
+          <cx:pt idx="305">14</cx:pt>
         </cx:lvl>
       </cx:numDim>
     </cx:data>
@@ -195,11 +1361,11 @@
   <cx:chart>
     <cx:plotArea>
       <cx:plotAreaRegion>
-        <cx:series layoutId="boxWhisker" uniqueId="{CB6C16B7-4A93-4787-A03D-1637CEC657C1}">
+        <cx:series layoutId="boxWhisker" uniqueId="{25A90DED-2B23-4E2A-8148-46DC28E2AEC0}">
           <cx:tx>
             <cx:txData>
               <cx:f>Sheet1!$A$1</cx:f>
-              <cx:v>tcp_snd_dat</cx:v>
+              <cx:v>tcp_rcv_dat</cx:v>
             </cx:txData>
           </cx:tx>
           <cx:dataId val="0"/>
@@ -208,11 +1374,11 @@
             <cx:statistics quartileMethod="exclusive"/>
           </cx:layoutPr>
         </cx:series>
-        <cx:series layoutId="boxWhisker" uniqueId="{EF0CB601-3A24-4936-960F-F33F8CAF2FBB}">
+        <cx:series layoutId="boxWhisker" uniqueId="{8E301ACF-7DB1-4716-9E24-DB666295D3DD}">
           <cx:tx>
             <cx:txData>
               <cx:f>Sheet1!$B$1</cx:f>
-              <cx:v>without</cx:v>
+              <cx:v>tcp_rcv_dat [Adapter]</cx:v>
             </cx:txData>
           </cx:tx>
           <cx:dataId val="1"/>
@@ -221,11 +1387,11 @@
             <cx:statistics quartileMethod="exclusive"/>
           </cx:layoutPr>
         </cx:series>
-        <cx:series layoutId="boxWhisker" uniqueId="{B82E855D-90C7-4824-9FA9-A57EEFB969A4}">
+        <cx:series layoutId="boxWhisker" uniqueId="{4D75B551-3B71-41A3-94F9-9146F0EA218D}">
           <cx:tx>
             <cx:txData>
               <cx:f>Sheet1!$C$1</cx:f>
-              <cx:v>with</cx:v>
+              <cx:v>tcp_snd_dat</cx:v>
             </cx:txData>
           </cx:tx>
           <cx:dataId val="2"/>
@@ -234,40 +1400,14 @@
             <cx:statistics quartileMethod="exclusive"/>
           </cx:layoutPr>
         </cx:series>
-        <cx:series layoutId="boxWhisker" uniqueId="{A730947F-4EB8-406D-A256-A6040717F007}">
+        <cx:series layoutId="boxWhisker" uniqueId="{87AD09F3-481B-4F42-86D6-0DF3A9336841}">
           <cx:tx>
             <cx:txData>
               <cx:f>Sheet1!$D$1</cx:f>
-              <cx:v>tcp_recv_dat</cx:v>
+              <cx:v>tcp_snd_dat [Adapter]</cx:v>
             </cx:txData>
           </cx:tx>
           <cx:dataId val="3"/>
-          <cx:layoutPr>
-            <cx:visibility meanLine="0" meanMarker="1" nonoutliers="0" outliers="1"/>
-            <cx:statistics quartileMethod="exclusive"/>
-          </cx:layoutPr>
-        </cx:series>
-        <cx:series layoutId="boxWhisker" uniqueId="{0FABE084-AA9C-4493-BABA-E8D3B0E20665}">
-          <cx:tx>
-            <cx:txData>
-              <cx:f>Sheet1!$E$1</cx:f>
-              <cx:v>without</cx:v>
-            </cx:txData>
-          </cx:tx>
-          <cx:dataId val="4"/>
-          <cx:layoutPr>
-            <cx:visibility meanLine="0" meanMarker="1" nonoutliers="0" outliers="1"/>
-            <cx:statistics quartileMethod="exclusive"/>
-          </cx:layoutPr>
-        </cx:series>
-        <cx:series layoutId="boxWhisker" uniqueId="{5CD3B6E8-E347-40E8-9F9F-042AA05427D0}">
-          <cx:tx>
-            <cx:txData>
-              <cx:f>Sheet1!$F$1</cx:f>
-              <cx:v>with</cx:v>
-            </cx:txData>
-          </cx:tx>
-          <cx:dataId val="5"/>
           <cx:layoutPr>
             <cx:visibility meanLine="0" meanMarker="1" nonoutliers="0" outliers="1"/>
             <cx:statistics quartileMethod="exclusive"/>
@@ -280,6 +1420,24 @@
       </cx:axis>
       <cx:axis id="1">
         <cx:valScaling/>
+        <cx:title>
+          <cx:tx>
+            <cx:rich>
+              <a:bodyPr spcFirstLastPara="1" vertOverflow="ellipsis" wrap="square" lIns="0" tIns="0" rIns="0" bIns="0" anchor="ctr" anchorCtr="1"/>
+              <a:lstStyle/>
+              <a:p>
+                <a:pPr algn="ctr">
+                  <a:defRPr sz="2000" baseline="0"/>
+                </a:pPr>
+                <a:r>
+                  <a:rPr lang="en-US" altLang="ja-JP" sz="2000" baseline="0"/>
+                  <a:t>Execution time [ms]</a:t>
+                </a:r>
+                <a:endParaRPr lang="ja-JP" sz="2000" baseline="0"/>
+              </a:p>
+            </cx:rich>
+          </cx:tx>
+        </cx:title>
         <cx:majorGridlines/>
         <cx:tickLabels/>
         <cx:txPr>
@@ -294,8 +1452,19 @@
         </cx:txPr>
       </cx:axis>
     </cx:plotArea>
+    <cx:legend pos="b" align="ctr" overlay="0">
+      <cx:txPr>
+        <a:bodyPr spcFirstLastPara="1" vertOverflow="ellipsis" wrap="square" lIns="0" tIns="0" rIns="0" bIns="0" anchor="ctr" anchorCtr="1"/>
+        <a:lstStyle/>
+        <a:p>
+          <a:pPr>
+            <a:defRPr sz="2000" baseline="0"/>
+          </a:pPr>
+          <a:endParaRPr lang="ja-JP" sz="2000" baseline="0"/>
+        </a:p>
+      </cx:txPr>
+    </cx:legend>
   </cx:chart>
-  <cx:clrMapOvr bg1="lt1" tx1="dk1" bg2="lt2" tx2="dk2" accent1="accent1" accent2="accent2" accent3="accent3" accent4="accent4" accent5="accent5" accent6="accent6" hlink="hlink" folHlink="folHlink"/>
 </cx:chartSpace>
 </file>
 
@@ -907,7 +2076,7 @@
           <a:p>
             <a:fld id="{00D06802-B8EF-4FD8-9511-F1F928CF3A55}" type="datetimeFigureOut">
               <a:rPr kumimoji="1" lang="ja-JP" altLang="en-US" smtClean="0"/>
-              <a:t>2017/2/7</a:t>
+              <a:t>2017/2/12</a:t>
             </a:fld>
             <a:endParaRPr kumimoji="1" lang="ja-JP" altLang="en-US"/>
           </a:p>
@@ -1338,7 +2507,7 @@
           <a:p>
             <a:fld id="{AA641DB4-C951-4763-94FC-F650C3AA7E65}" type="datetimeFigureOut">
               <a:rPr kumimoji="1" lang="ja-JP" altLang="en-US" smtClean="0"/>
-              <a:t>2017/2/7</a:t>
+              <a:t>2017/2/12</a:t>
             </a:fld>
             <a:endParaRPr kumimoji="1" lang="ja-JP" altLang="en-US"/>
           </a:p>
@@ -1540,7 +2709,7 @@
           <a:p>
             <a:fld id="{AA641DB4-C951-4763-94FC-F650C3AA7E65}" type="datetimeFigureOut">
               <a:rPr kumimoji="1" lang="ja-JP" altLang="en-US" smtClean="0"/>
-              <a:t>2017/2/7</a:t>
+              <a:t>2017/2/12</a:t>
             </a:fld>
             <a:endParaRPr kumimoji="1" lang="ja-JP" altLang="en-US"/>
           </a:p>
@@ -1752,7 +2921,7 @@
           <a:p>
             <a:fld id="{AA641DB4-C951-4763-94FC-F650C3AA7E65}" type="datetimeFigureOut">
               <a:rPr kumimoji="1" lang="ja-JP" altLang="en-US" smtClean="0"/>
-              <a:t>2017/2/7</a:t>
+              <a:t>2017/2/12</a:t>
             </a:fld>
             <a:endParaRPr kumimoji="1" lang="ja-JP" altLang="en-US"/>
           </a:p>
@@ -1954,7 +3123,7 @@
           <a:p>
             <a:fld id="{AA641DB4-C951-4763-94FC-F650C3AA7E65}" type="datetimeFigureOut">
               <a:rPr kumimoji="1" lang="ja-JP" altLang="en-US" smtClean="0"/>
-              <a:t>2017/2/7</a:t>
+              <a:t>2017/2/12</a:t>
             </a:fld>
             <a:endParaRPr kumimoji="1" lang="ja-JP" altLang="en-US"/>
           </a:p>
@@ -2200,7 +3369,7 @@
           <a:p>
             <a:fld id="{AA641DB4-C951-4763-94FC-F650C3AA7E65}" type="datetimeFigureOut">
               <a:rPr kumimoji="1" lang="ja-JP" altLang="en-US" smtClean="0"/>
-              <a:t>2017/2/7</a:t>
+              <a:t>2017/2/12</a:t>
             </a:fld>
             <a:endParaRPr kumimoji="1" lang="ja-JP" altLang="en-US"/>
           </a:p>
@@ -2496,7 +3665,7 @@
           <a:p>
             <a:fld id="{AA641DB4-C951-4763-94FC-F650C3AA7E65}" type="datetimeFigureOut">
               <a:rPr kumimoji="1" lang="ja-JP" altLang="en-US" smtClean="0"/>
-              <a:t>2017/2/7</a:t>
+              <a:t>2017/2/12</a:t>
             </a:fld>
             <a:endParaRPr kumimoji="1" lang="ja-JP" altLang="en-US"/>
           </a:p>
@@ -2927,7 +4096,7 @@
           <a:p>
             <a:fld id="{AA641DB4-C951-4763-94FC-F650C3AA7E65}" type="datetimeFigureOut">
               <a:rPr kumimoji="1" lang="ja-JP" altLang="en-US" smtClean="0"/>
-              <a:t>2017/2/7</a:t>
+              <a:t>2017/2/12</a:t>
             </a:fld>
             <a:endParaRPr kumimoji="1" lang="ja-JP" altLang="en-US"/>
           </a:p>
@@ -3045,7 +4214,7 @@
           <a:p>
             <a:fld id="{AA641DB4-C951-4763-94FC-F650C3AA7E65}" type="datetimeFigureOut">
               <a:rPr kumimoji="1" lang="ja-JP" altLang="en-US" smtClean="0"/>
-              <a:t>2017/2/7</a:t>
+              <a:t>2017/2/12</a:t>
             </a:fld>
             <a:endParaRPr kumimoji="1" lang="ja-JP" altLang="en-US"/>
           </a:p>
@@ -3140,7 +4309,7 @@
           <a:p>
             <a:fld id="{AA641DB4-C951-4763-94FC-F650C3AA7E65}" type="datetimeFigureOut">
               <a:rPr kumimoji="1" lang="ja-JP" altLang="en-US" smtClean="0"/>
-              <a:t>2017/2/7</a:t>
+              <a:t>2017/2/12</a:t>
             </a:fld>
             <a:endParaRPr kumimoji="1" lang="ja-JP" altLang="en-US"/>
           </a:p>
@@ -3449,7 +4618,7 @@
           <a:p>
             <a:fld id="{AA641DB4-C951-4763-94FC-F650C3AA7E65}" type="datetimeFigureOut">
               <a:rPr kumimoji="1" lang="ja-JP" altLang="en-US" smtClean="0"/>
-              <a:t>2017/2/7</a:t>
+              <a:t>2017/2/12</a:t>
             </a:fld>
             <a:endParaRPr kumimoji="1" lang="ja-JP" altLang="en-US"/>
           </a:p>
@@ -3702,7 +4871,7 @@
           <a:p>
             <a:fld id="{AA641DB4-C951-4763-94FC-F650C3AA7E65}" type="datetimeFigureOut">
               <a:rPr kumimoji="1" lang="ja-JP" altLang="en-US" smtClean="0"/>
-              <a:t>2017/2/7</a:t>
+              <a:t>2017/2/12</a:t>
             </a:fld>
             <a:endParaRPr kumimoji="1" lang="ja-JP" altLang="en-US"/>
           </a:p>
@@ -3947,7 +5116,7 @@
           <a:p>
             <a:fld id="{AA641DB4-C951-4763-94FC-F650C3AA7E65}" type="datetimeFigureOut">
               <a:rPr kumimoji="1" lang="ja-JP" altLang="en-US" smtClean="0"/>
-              <a:t>2017/2/7</a:t>
+              <a:t>2017/2/12</a:t>
             </a:fld>
             <a:endParaRPr kumimoji="1" lang="ja-JP" altLang="en-US"/>
           </a:p>
@@ -4353,26 +5522,26 @@
         </a:xfrm>
       </p:grpSpPr>
       <mc:AlternateContent xmlns:mc="http://schemas.openxmlformats.org/markup-compatibility/2006">
-        <mc:Choice xmlns:cx="http://schemas.microsoft.com/office/drawing/2014/chartex" Requires="cx">
+        <mc:Choice xmlns:cx1="http://schemas.microsoft.com/office/drawing/2015/9/8/chartex" Requires="cx1">
           <p:graphicFrame>
             <p:nvGraphicFramePr>
-              <p:cNvPr id="5" name="グラフ 4"/>
+              <p:cNvPr id="7" name="グラフ 6"/>
               <p:cNvGraphicFramePr/>
               <p:nvPr>
                 <p:extLst>
                   <p:ext uri="{D42A27DB-BD31-4B8C-83A1-F6EECF244321}">
-                    <p14:modId xmlns:p14="http://schemas.microsoft.com/office/powerpoint/2010/main" val="3529460370"/>
+                    <p14:modId xmlns:p14="http://schemas.microsoft.com/office/powerpoint/2010/main" val="2654425670"/>
                   </p:ext>
                 </p:extLst>
               </p:nvPr>
             </p:nvGraphicFramePr>
             <p:xfrm>
               <a:off x="0" y="0"/>
-              <a:ext cx="12192000" cy="6858000"/>
+              <a:ext cx="12192000" cy="6857999"/>
             </p:xfrm>
             <a:graphic>
               <a:graphicData uri="http://schemas.microsoft.com/office/drawing/2014/chartex">
-                <c:chart xmlns:c="http://schemas.openxmlformats.org/drawingml/2006/chart" xmlns:r="http://schemas.openxmlformats.org/officeDocument/2006/relationships" r:id="rId2"/>
+                <cx:chart xmlns:cx="http://schemas.microsoft.com/office/drawing/2014/chartex" xmlns:r="http://schemas.openxmlformats.org/officeDocument/2006/relationships" r:id="rId2"/>
               </a:graphicData>
             </a:graphic>
           </p:graphicFrame>
@@ -4380,7 +5549,7 @@
         <mc:Fallback>
           <p:pic>
             <p:nvPicPr>
-              <p:cNvPr id="5" name="グラフ 4"/>
+              <p:cNvPr id="7" name="グラフ 6"/>
               <p:cNvPicPr>
                 <a:picLocks noGrp="1" noRot="1" noChangeAspect="1" noMove="1" noResize="1" noEditPoints="1" noAdjustHandles="1" noChangeArrowheads="1" noChangeShapeType="1"/>
               </p:cNvPicPr>
@@ -4395,7 +5564,7 @@
             <p:spPr>
               <a:xfrm>
                 <a:off x="0" y="0"/>
-                <a:ext cx="12192000" cy="6858000"/>
+                <a:ext cx="12192000" cy="6857999"/>
               </a:xfrm>
               <a:prstGeom prst="rect">
                 <a:avLst/>
@@ -4404,118 +5573,6 @@
           </p:pic>
         </mc:Fallback>
       </mc:AlternateContent>
-      <p:sp>
-        <p:nvSpPr>
-          <p:cNvPr id="3" name="正方形/長方形 2"/>
-          <p:cNvSpPr/>
-          <p:nvPr/>
-        </p:nvSpPr>
-        <p:spPr>
-          <a:xfrm>
-            <a:off x="4557010" y="6157368"/>
-            <a:ext cx="1753849" cy="914400"/>
-          </a:xfrm>
-          <a:prstGeom prst="rect">
-            <a:avLst/>
-          </a:prstGeom>
-          <a:noFill/>
-          <a:ln>
-            <a:noFill/>
-          </a:ln>
-        </p:spPr>
-        <p:style>
-          <a:lnRef idx="2">
-            <a:schemeClr val="accent1">
-              <a:shade val="50000"/>
-            </a:schemeClr>
-          </a:lnRef>
-          <a:fillRef idx="1">
-            <a:schemeClr val="accent1"/>
-          </a:fillRef>
-          <a:effectRef idx="0">
-            <a:schemeClr val="accent1"/>
-          </a:effectRef>
-          <a:fontRef idx="minor">
-            <a:schemeClr val="lt1"/>
-          </a:fontRef>
-        </p:style>
-        <p:txBody>
-          <a:bodyPr rtlCol="0" anchor="ctr"/>
-          <a:lstStyle/>
-          <a:p>
-            <a:pPr algn="ctr"/>
-            <a:r>
-              <a:rPr lang="en-US" altLang="ja-JP" sz="2400" dirty="0" err="1" smtClean="0">
-                <a:solidFill>
-                  <a:schemeClr val="tx1"/>
-                </a:solidFill>
-              </a:rPr>
-              <a:t>tcp_snd_dat</a:t>
-            </a:r>
-            <a:endParaRPr kumimoji="1" lang="ja-JP" altLang="en-US" sz="2400" dirty="0">
-              <a:solidFill>
-                <a:schemeClr val="tx1"/>
-              </a:solidFill>
-            </a:endParaRPr>
-          </a:p>
-        </p:txBody>
-      </p:sp>
-      <p:sp>
-        <p:nvSpPr>
-          <p:cNvPr id="6" name="正方形/長方形 5"/>
-          <p:cNvSpPr/>
-          <p:nvPr/>
-        </p:nvSpPr>
-        <p:spPr>
-          <a:xfrm>
-            <a:off x="7272728" y="6157368"/>
-            <a:ext cx="1753849" cy="914400"/>
-          </a:xfrm>
-          <a:prstGeom prst="rect">
-            <a:avLst/>
-          </a:prstGeom>
-          <a:noFill/>
-          <a:ln>
-            <a:noFill/>
-          </a:ln>
-        </p:spPr>
-        <p:style>
-          <a:lnRef idx="2">
-            <a:schemeClr val="accent1">
-              <a:shade val="50000"/>
-            </a:schemeClr>
-          </a:lnRef>
-          <a:fillRef idx="1">
-            <a:schemeClr val="accent1"/>
-          </a:fillRef>
-          <a:effectRef idx="0">
-            <a:schemeClr val="accent1"/>
-          </a:effectRef>
-          <a:fontRef idx="minor">
-            <a:schemeClr val="lt1"/>
-          </a:fontRef>
-        </p:style>
-        <p:txBody>
-          <a:bodyPr rtlCol="0" anchor="ctr"/>
-          <a:lstStyle/>
-          <a:p>
-            <a:pPr algn="ctr"/>
-            <a:r>
-              <a:rPr lang="en-US" altLang="ja-JP" sz="2400" dirty="0" err="1" smtClean="0">
-                <a:solidFill>
-                  <a:schemeClr val="tx1"/>
-                </a:solidFill>
-              </a:rPr>
-              <a:t>tcp_rcv_dat</a:t>
-            </a:r>
-            <a:endParaRPr kumimoji="1" lang="ja-JP" altLang="en-US" sz="2400" dirty="0">
-              <a:solidFill>
-                <a:schemeClr val="tx1"/>
-              </a:solidFill>
-            </a:endParaRPr>
-          </a:p>
-        </p:txBody>
-      </p:sp>
     </p:spTree>
     <p:extLst>
       <p:ext uri="{BB962C8B-B14F-4D97-AF65-F5344CB8AC3E}">

</xml_diff>